<commit_message>
fix Generation -> Epoch
</commit_message>
<xml_diff>
--- a/Autoencoder.pptx
+++ b/Autoencoder.pptx
@@ -11488,7 +11488,7 @@
           <a:p>
             <a:fld id="{915FBBFD-2182-47FE-AE8B-3BFAF8A382A6}" type="datetimeFigureOut">
               <a:rPr lang="LID4096" smtClean="0"/>
-              <a:t>01/07/2020</a:t>
+              <a:t>01/17/2020</a:t>
             </a:fld>
             <a:endParaRPr lang="LID4096"/>
           </a:p>
@@ -12370,7 +12370,7 @@
             <a:fld id="{1C14EF4D-658A-4366-94B4-93FA2468FDCF}" type="datetime4">
               <a:rPr lang="de-DE" smtClean="0"/>
               <a:pPr/>
-              <a:t>7. Januar 2020</a:t>
+              <a:t>17. Januar 2020</a:t>
             </a:fld>
             <a:endParaRPr lang="de-DE" dirty="0"/>
           </a:p>
@@ -12627,7 +12627,7 @@
             <a:fld id="{C8824D12-D2B4-48EE-A8D8-AA5CB9F5840D}" type="datetime4">
               <a:rPr lang="de-DE" smtClean="0"/>
               <a:pPr/>
-              <a:t>7. Januar 2020</a:t>
+              <a:t>17. Januar 2020</a:t>
             </a:fld>
             <a:endParaRPr lang="de-DE" dirty="0"/>
           </a:p>
@@ -12924,7 +12924,7 @@
             <a:fld id="{335A9032-5A32-4C09-B68F-E69B2C18F33B}" type="datetime4">
               <a:rPr lang="de-DE" smtClean="0"/>
               <a:pPr/>
-              <a:t>7. Januar 2020</a:t>
+              <a:t>17. Januar 2020</a:t>
             </a:fld>
             <a:endParaRPr lang="de-DE"/>
           </a:p>
@@ -13175,7 +13175,7 @@
             <a:fld id="{5BAAA7C2-E2AA-4346-8B86-57087B26CC09}" type="datetime4">
               <a:rPr lang="de-DE" smtClean="0"/>
               <a:pPr/>
-              <a:t>7. Januar 2020</a:t>
+              <a:t>17. Januar 2020</a:t>
             </a:fld>
             <a:endParaRPr lang="de-DE"/>
           </a:p>
@@ -13314,7 +13314,7 @@
             <a:fld id="{06A98D09-1692-4D57-9F3B-E6E8F8AED3A2}" type="datetime4">
               <a:rPr lang="de-DE" smtClean="0"/>
               <a:pPr/>
-              <a:t>7. Januar 2020</a:t>
+              <a:t>17. Januar 2020</a:t>
             </a:fld>
             <a:endParaRPr lang="de-DE"/>
           </a:p>
@@ -13621,7 +13621,7 @@
             <a:fld id="{D75B4228-AEF4-48F0-B7A8-B7806BF7B6C0}" type="datetime4">
               <a:rPr lang="de-DE" smtClean="0"/>
               <a:pPr/>
-              <a:t>7. Januar 2020</a:t>
+              <a:t>17. Januar 2020</a:t>
             </a:fld>
             <a:endParaRPr lang="de-DE"/>
           </a:p>
@@ -13884,7 +13884,7 @@
             <a:fld id="{BCD372EC-CF3B-481A-BC00-44BCA4A3CC53}" type="datetime4">
               <a:rPr lang="de-DE" smtClean="0"/>
               <a:pPr/>
-              <a:t>7. Januar 2020</a:t>
+              <a:t>17. Januar 2020</a:t>
             </a:fld>
             <a:endParaRPr lang="de-DE" dirty="0"/>
           </a:p>
@@ -14749,7 +14749,7 @@
             <a:fld id="{1C14EF4D-658A-4366-94B4-93FA2468FDCF}" type="datetime4">
               <a:rPr lang="de-DE" smtClean="0"/>
               <a:pPr/>
-              <a:t>7. Januar 2020</a:t>
+              <a:t>17. Januar 2020</a:t>
             </a:fld>
             <a:endParaRPr lang="de-DE" dirty="0"/>
           </a:p>
@@ -14867,7 +14867,7 @@
             <a:fld id="{C8824D12-D2B4-48EE-A8D8-AA5CB9F5840D}" type="datetime4">
               <a:rPr lang="de-DE" smtClean="0"/>
               <a:pPr/>
-              <a:t>7. Januar 2020</a:t>
+              <a:t>17. Januar 2020</a:t>
             </a:fld>
             <a:endParaRPr lang="de-DE" dirty="0"/>
           </a:p>
@@ -14962,7 +14962,7 @@
           <a:p>
             <a:r>
               <a:rPr lang="en-US" dirty="0"/>
-              <a:t>1. Generation</a:t>
+              <a:t>1. Epoch</a:t>
             </a:r>
             <a:endParaRPr lang="LID4096" dirty="0"/>
           </a:p>
@@ -14998,7 +14998,7 @@
           <a:p>
             <a:r>
               <a:rPr lang="en-US" dirty="0"/>
-              <a:t>500. Generation</a:t>
+              <a:t>500. Epoch</a:t>
             </a:r>
             <a:endParaRPr lang="LID4096" dirty="0"/>
           </a:p>
@@ -15181,7 +15181,7 @@
             <a:fld id="{C8824D12-D2B4-48EE-A8D8-AA5CB9F5840D}" type="datetime4">
               <a:rPr lang="de-DE" smtClean="0"/>
               <a:pPr/>
-              <a:t>7. Januar 2020</a:t>
+              <a:t>17. Januar 2020</a:t>
             </a:fld>
             <a:endParaRPr lang="de-DE" dirty="0"/>
           </a:p>
@@ -15359,7 +15359,7 @@
             <a:fld id="{C8824D12-D2B4-48EE-A8D8-AA5CB9F5840D}" type="datetime4">
               <a:rPr lang="de-DE" smtClean="0"/>
               <a:pPr/>
-              <a:t>7. Januar 2020</a:t>
+              <a:t>17. Januar 2020</a:t>
             </a:fld>
             <a:endParaRPr lang="de-DE" dirty="0"/>
           </a:p>
@@ -15454,7 +15454,7 @@
           <a:p>
             <a:r>
               <a:rPr lang="en-US" dirty="0"/>
-              <a:t>1. Generation</a:t>
+              <a:t>1. Epoch</a:t>
             </a:r>
             <a:endParaRPr lang="LID4096" dirty="0"/>
           </a:p>
@@ -15490,7 +15490,7 @@
           <a:p>
             <a:r>
               <a:rPr lang="en-US" dirty="0"/>
-              <a:t>500. Generation</a:t>
+              <a:t>500. Epoch</a:t>
             </a:r>
             <a:endParaRPr lang="LID4096" dirty="0"/>
           </a:p>
@@ -15639,7 +15639,7 @@
             <a:fld id="{C8824D12-D2B4-48EE-A8D8-AA5CB9F5840D}" type="datetime4">
               <a:rPr lang="de-DE" smtClean="0"/>
               <a:pPr/>
-              <a:t>7. Januar 2020</a:t>
+              <a:t>17. Januar 2020</a:t>
             </a:fld>
             <a:endParaRPr lang="de-DE" dirty="0"/>
           </a:p>
@@ -15865,7 +15865,7 @@
             <a:fld id="{C8824D12-D2B4-48EE-A8D8-AA5CB9F5840D}" type="datetime4">
               <a:rPr lang="de-DE" smtClean="0"/>
               <a:pPr/>
-              <a:t>7. Januar 2020</a:t>
+              <a:t>17. Januar 2020</a:t>
             </a:fld>
             <a:endParaRPr lang="de-DE" dirty="0"/>
           </a:p>
@@ -16043,7 +16043,7 @@
             <a:fld id="{C8824D12-D2B4-48EE-A8D8-AA5CB9F5840D}" type="datetime4">
               <a:rPr lang="de-DE" smtClean="0"/>
               <a:pPr/>
-              <a:t>7. Januar 2020</a:t>
+              <a:t>17. Januar 2020</a:t>
             </a:fld>
             <a:endParaRPr lang="de-DE" dirty="0"/>
           </a:p>
@@ -16442,7 +16442,7 @@
             <a:fld id="{C8824D12-D2B4-48EE-A8D8-AA5CB9F5840D}" type="datetime4">
               <a:rPr lang="de-DE" smtClean="0"/>
               <a:pPr/>
-              <a:t>7. Januar 2020</a:t>
+              <a:t>17. Januar 2020</a:t>
             </a:fld>
             <a:endParaRPr lang="de-DE" dirty="0"/>
           </a:p>
@@ -16771,7 +16771,7 @@
             <a:fld id="{C8824D12-D2B4-48EE-A8D8-AA5CB9F5840D}" type="datetime4">
               <a:rPr lang="de-DE" smtClean="0"/>
               <a:pPr/>
-              <a:t>7. Januar 2020</a:t>
+              <a:t>17. Januar 2020</a:t>
             </a:fld>
             <a:endParaRPr lang="de-DE" dirty="0"/>
           </a:p>
@@ -17000,7 +17000,7 @@
             <a:fld id="{C8824D12-D2B4-48EE-A8D8-AA5CB9F5840D}" type="datetime4">
               <a:rPr lang="de-DE" smtClean="0"/>
               <a:pPr/>
-              <a:t>7. Januar 2020</a:t>
+              <a:t>17. Januar 2020</a:t>
             </a:fld>
             <a:endParaRPr lang="de-DE" dirty="0"/>
           </a:p>
@@ -17173,7 +17173,7 @@
             <a:fld id="{C8824D12-D2B4-48EE-A8D8-AA5CB9F5840D}" type="datetime4">
               <a:rPr lang="de-DE" smtClean="0"/>
               <a:pPr/>
-              <a:t>7. Januar 2020</a:t>
+              <a:t>17. Januar 2020</a:t>
             </a:fld>
             <a:endParaRPr lang="de-DE" dirty="0"/>
           </a:p>
@@ -17393,7 +17393,7 @@
             <a:fld id="{C8824D12-D2B4-48EE-A8D8-AA5CB9F5840D}" type="datetime4">
               <a:rPr lang="de-DE" smtClean="0"/>
               <a:pPr/>
-              <a:t>7. Januar 2020</a:t>
+              <a:t>17. Januar 2020</a:t>
             </a:fld>
             <a:endParaRPr lang="de-DE" dirty="0"/>
           </a:p>
@@ -17603,7 +17603,7 @@
             <a:fld id="{C8824D12-D2B4-48EE-A8D8-AA5CB9F5840D}" type="datetime4">
               <a:rPr lang="de-DE" smtClean="0"/>
               <a:pPr/>
-              <a:t>7. Januar 2020</a:t>
+              <a:t>17. Januar 2020</a:t>
             </a:fld>
             <a:endParaRPr lang="de-DE" dirty="0"/>
           </a:p>
@@ -17751,7 +17751,7 @@
             <a:fld id="{C8824D12-D2B4-48EE-A8D8-AA5CB9F5840D}" type="datetime4">
               <a:rPr lang="de-DE" smtClean="0"/>
               <a:pPr/>
-              <a:t>7. Januar 2020</a:t>
+              <a:t>17. Januar 2020</a:t>
             </a:fld>
             <a:endParaRPr lang="de-DE" dirty="0"/>
           </a:p>
@@ -17959,7 +17959,7 @@
             <a:fld id="{C8824D12-D2B4-48EE-A8D8-AA5CB9F5840D}" type="datetime4">
               <a:rPr lang="de-DE" smtClean="0"/>
               <a:pPr/>
-              <a:t>7. Januar 2020</a:t>
+              <a:t>17. Januar 2020</a:t>
             </a:fld>
             <a:endParaRPr lang="de-DE" dirty="0"/>
           </a:p>
@@ -18054,7 +18054,7 @@
           <a:p>
             <a:r>
               <a:rPr lang="en-US" dirty="0"/>
-              <a:t>1. Generation</a:t>
+              <a:t>1. Epoch</a:t>
             </a:r>
             <a:endParaRPr lang="LID4096" dirty="0"/>
           </a:p>
@@ -18090,7 +18090,7 @@
           <a:p>
             <a:r>
               <a:rPr lang="en-US" dirty="0"/>
-              <a:t>500. Generation</a:t>
+              <a:t>500. Epoch</a:t>
             </a:r>
             <a:endParaRPr lang="LID4096" dirty="0"/>
           </a:p>
@@ -18239,7 +18239,7 @@
             <a:fld id="{C8824D12-D2B4-48EE-A8D8-AA5CB9F5840D}" type="datetime4">
               <a:rPr lang="de-DE" smtClean="0"/>
               <a:pPr/>
-              <a:t>7. Januar 2020</a:t>
+              <a:t>17. Januar 2020</a:t>
             </a:fld>
             <a:endParaRPr lang="de-DE" dirty="0"/>
           </a:p>
@@ -18450,7 +18450,7 @@
             <a:fld id="{C8824D12-D2B4-48EE-A8D8-AA5CB9F5840D}" type="datetime4">
               <a:rPr lang="de-DE" smtClean="0"/>
               <a:pPr/>
-              <a:t>7. Januar 2020</a:t>
+              <a:t>17. Januar 2020</a:t>
             </a:fld>
             <a:endParaRPr lang="de-DE" dirty="0"/>
           </a:p>
@@ -18575,7 +18575,7 @@
           <a:p>
             <a:r>
               <a:rPr lang="en-US" dirty="0"/>
-              <a:t>1. Generation</a:t>
+              <a:t>1. Epoch</a:t>
             </a:r>
             <a:endParaRPr lang="LID4096" dirty="0"/>
           </a:p>
@@ -18611,7 +18611,7 @@
           <a:p>
             <a:r>
               <a:rPr lang="en-US" dirty="0"/>
-              <a:t>500. Generation</a:t>
+              <a:t>500. Epoch</a:t>
             </a:r>
             <a:endParaRPr lang="LID4096" dirty="0"/>
           </a:p>
@@ -18700,7 +18700,7 @@
             <a:fld id="{C8824D12-D2B4-48EE-A8D8-AA5CB9F5840D}" type="datetime4">
               <a:rPr lang="de-DE" smtClean="0"/>
               <a:pPr/>
-              <a:t>7. Januar 2020</a:t>
+              <a:t>17. Januar 2020</a:t>
             </a:fld>
             <a:endParaRPr lang="de-DE" dirty="0"/>
           </a:p>

</xml_diff>